<commit_message>
changes to tools and functiions
</commit_message>
<xml_diff>
--- a/Project Proposal.pptx
+++ b/Project Proposal.pptx
@@ -3368,7 +3368,7 @@
           <a:p>
             <a:fld id="{72FBF2AF-2DAC-4FB3-BCA8-0B78B7F8918A}" type="datetimeFigureOut">
               <a:rPr lang="en-US" smtClean="0"/>
-              <a:t>7/25/2021</a:t>
+              <a:t>7/26/2021</a:t>
             </a:fld>
             <a:endParaRPr lang="en-US"/>
           </a:p>
@@ -3566,7 +3566,7 @@
           <a:p>
             <a:fld id="{72FBF2AF-2DAC-4FB3-BCA8-0B78B7F8918A}" type="datetimeFigureOut">
               <a:rPr lang="en-US" smtClean="0"/>
-              <a:t>7/25/2021</a:t>
+              <a:t>7/26/2021</a:t>
             </a:fld>
             <a:endParaRPr lang="en-US"/>
           </a:p>
@@ -3774,7 +3774,7 @@
           <a:p>
             <a:fld id="{72FBF2AF-2DAC-4FB3-BCA8-0B78B7F8918A}" type="datetimeFigureOut">
               <a:rPr lang="en-US" smtClean="0"/>
-              <a:t>7/25/2021</a:t>
+              <a:t>7/26/2021</a:t>
             </a:fld>
             <a:endParaRPr lang="en-US"/>
           </a:p>
@@ -3994,7 +3994,7 @@
           <a:p>
             <a:fld id="{A884A402-9A27-48C5-B7F3-8545A451B1BF}" type="datetimeFigureOut">
               <a:rPr lang="en-US" smtClean="0"/>
-              <a:t>7/25/2021</a:t>
+              <a:t>7/26/2021</a:t>
             </a:fld>
             <a:endParaRPr lang="en-US"/>
           </a:p>
@@ -4192,7 +4192,7 @@
           <a:p>
             <a:fld id="{A884A402-9A27-48C5-B7F3-8545A451B1BF}" type="datetimeFigureOut">
               <a:rPr lang="en-US" smtClean="0"/>
-              <a:t>7/25/2021</a:t>
+              <a:t>7/26/2021</a:t>
             </a:fld>
             <a:endParaRPr lang="en-US"/>
           </a:p>
@@ -4467,7 +4467,7 @@
           <a:p>
             <a:fld id="{A884A402-9A27-48C5-B7F3-8545A451B1BF}" type="datetimeFigureOut">
               <a:rPr lang="en-US" smtClean="0"/>
-              <a:t>7/25/2021</a:t>
+              <a:t>7/26/2021</a:t>
             </a:fld>
             <a:endParaRPr lang="en-US"/>
           </a:p>
@@ -4732,7 +4732,7 @@
           <a:p>
             <a:fld id="{A884A402-9A27-48C5-B7F3-8545A451B1BF}" type="datetimeFigureOut">
               <a:rPr lang="en-US" smtClean="0"/>
-              <a:t>7/25/2021</a:t>
+              <a:t>7/26/2021</a:t>
             </a:fld>
             <a:endParaRPr lang="en-US"/>
           </a:p>
@@ -5144,7 +5144,7 @@
           <a:p>
             <a:fld id="{A884A402-9A27-48C5-B7F3-8545A451B1BF}" type="datetimeFigureOut">
               <a:rPr lang="en-US" smtClean="0"/>
-              <a:t>7/25/2021</a:t>
+              <a:t>7/26/2021</a:t>
             </a:fld>
             <a:endParaRPr lang="en-US"/>
           </a:p>
@@ -5285,7 +5285,7 @@
           <a:p>
             <a:fld id="{A884A402-9A27-48C5-B7F3-8545A451B1BF}" type="datetimeFigureOut">
               <a:rPr lang="en-US" smtClean="0"/>
-              <a:t>7/25/2021</a:t>
+              <a:t>7/26/2021</a:t>
             </a:fld>
             <a:endParaRPr lang="en-US"/>
           </a:p>
@@ -5398,7 +5398,7 @@
           <a:p>
             <a:fld id="{A884A402-9A27-48C5-B7F3-8545A451B1BF}" type="datetimeFigureOut">
               <a:rPr lang="en-US" smtClean="0"/>
-              <a:t>7/25/2021</a:t>
+              <a:t>7/26/2021</a:t>
             </a:fld>
             <a:endParaRPr lang="en-US"/>
           </a:p>
@@ -5709,7 +5709,7 @@
           <a:p>
             <a:fld id="{A884A402-9A27-48C5-B7F3-8545A451B1BF}" type="datetimeFigureOut">
               <a:rPr lang="en-US" smtClean="0"/>
-              <a:t>7/25/2021</a:t>
+              <a:t>7/26/2021</a:t>
             </a:fld>
             <a:endParaRPr lang="en-US"/>
           </a:p>
@@ -5907,7 +5907,7 @@
           <a:p>
             <a:fld id="{72FBF2AF-2DAC-4FB3-BCA8-0B78B7F8918A}" type="datetimeFigureOut">
               <a:rPr lang="en-US" smtClean="0"/>
-              <a:t>7/25/2021</a:t>
+              <a:t>7/26/2021</a:t>
             </a:fld>
             <a:endParaRPr lang="en-US"/>
           </a:p>
@@ -6195,7 +6195,7 @@
           <a:p>
             <a:fld id="{A884A402-9A27-48C5-B7F3-8545A451B1BF}" type="datetimeFigureOut">
               <a:rPr lang="en-US" smtClean="0"/>
-              <a:t>7/25/2021</a:t>
+              <a:t>7/26/2021</a:t>
             </a:fld>
             <a:endParaRPr lang="en-US"/>
           </a:p>
@@ -6393,7 +6393,7 @@
           <a:p>
             <a:fld id="{A884A402-9A27-48C5-B7F3-8545A451B1BF}" type="datetimeFigureOut">
               <a:rPr lang="en-US" smtClean="0"/>
-              <a:t>7/25/2021</a:t>
+              <a:t>7/26/2021</a:t>
             </a:fld>
             <a:endParaRPr lang="en-US"/>
           </a:p>
@@ -6601,7 +6601,7 @@
           <a:p>
             <a:fld id="{A884A402-9A27-48C5-B7F3-8545A451B1BF}" type="datetimeFigureOut">
               <a:rPr lang="en-US" smtClean="0"/>
-              <a:t>7/25/2021</a:t>
+              <a:t>7/26/2021</a:t>
             </a:fld>
             <a:endParaRPr lang="en-US"/>
           </a:p>
@@ -7009,7 +7009,7 @@
           <a:p>
             <a:fld id="{A884A402-9A27-48C5-B7F3-8545A451B1BF}" type="datetimeFigureOut">
               <a:rPr lang="en-US" smtClean="0"/>
-              <a:t>7/25/2021</a:t>
+              <a:t>7/26/2021</a:t>
             </a:fld>
             <a:endParaRPr lang="en-US"/>
           </a:p>
@@ -7240,7 +7240,7 @@
           <a:p>
             <a:fld id="{A884A402-9A27-48C5-B7F3-8545A451B1BF}" type="datetimeFigureOut">
               <a:rPr lang="en-US" smtClean="0"/>
-              <a:t>7/25/2021</a:t>
+              <a:t>7/26/2021</a:t>
             </a:fld>
             <a:endParaRPr lang="en-US"/>
           </a:p>
@@ -8274,7 +8274,7 @@
           <a:p>
             <a:fld id="{A884A402-9A27-48C5-B7F3-8545A451B1BF}" type="datetimeFigureOut">
               <a:rPr lang="en-US" smtClean="0"/>
-              <a:t>7/25/2021</a:t>
+              <a:t>7/26/2021</a:t>
             </a:fld>
             <a:endParaRPr lang="en-US"/>
           </a:p>
@@ -8546,7 +8546,7 @@
           <a:p>
             <a:fld id="{A884A402-9A27-48C5-B7F3-8545A451B1BF}" type="datetimeFigureOut">
               <a:rPr lang="en-US" smtClean="0"/>
-              <a:t>7/25/2021</a:t>
+              <a:t>7/26/2021</a:t>
             </a:fld>
             <a:endParaRPr lang="en-US"/>
           </a:p>
@@ -8956,7 +8956,7 @@
           <a:p>
             <a:fld id="{A884A402-9A27-48C5-B7F3-8545A451B1BF}" type="datetimeFigureOut">
               <a:rPr lang="en-US" smtClean="0"/>
-              <a:t>7/25/2021</a:t>
+              <a:t>7/26/2021</a:t>
             </a:fld>
             <a:endParaRPr lang="en-US"/>
           </a:p>
@@ -9083,7 +9083,7 @@
           <a:p>
             <a:fld id="{A884A402-9A27-48C5-B7F3-8545A451B1BF}" type="datetimeFigureOut">
               <a:rPr lang="en-US" smtClean="0"/>
-              <a:t>7/25/2021</a:t>
+              <a:t>7/26/2021</a:t>
             </a:fld>
             <a:endParaRPr lang="en-US"/>
           </a:p>
@@ -9178,7 +9178,7 @@
           <a:p>
             <a:fld id="{A884A402-9A27-48C5-B7F3-8545A451B1BF}" type="datetimeFigureOut">
               <a:rPr lang="en-US" smtClean="0"/>
-              <a:t>7/25/2021</a:t>
+              <a:t>7/26/2021</a:t>
             </a:fld>
             <a:endParaRPr lang="en-US"/>
           </a:p>
@@ -9477,7 +9477,7 @@
           <a:p>
             <a:fld id="{72FBF2AF-2DAC-4FB3-BCA8-0B78B7F8918A}" type="datetimeFigureOut">
               <a:rPr lang="en-US" smtClean="0"/>
-              <a:t>7/25/2021</a:t>
+              <a:t>7/26/2021</a:t>
             </a:fld>
             <a:endParaRPr lang="en-US"/>
           </a:p>
@@ -10534,7 +10534,7 @@
           <a:p>
             <a:fld id="{A884A402-9A27-48C5-B7F3-8545A451B1BF}" type="datetimeFigureOut">
               <a:rPr lang="en-US" smtClean="0"/>
-              <a:t>7/25/2021</a:t>
+              <a:t>7/26/2021</a:t>
             </a:fld>
             <a:endParaRPr lang="en-US"/>
           </a:p>
@@ -11642,7 +11642,7 @@
           <a:p>
             <a:fld id="{A884A402-9A27-48C5-B7F3-8545A451B1BF}" type="datetimeFigureOut">
               <a:rPr lang="en-US" smtClean="0"/>
-              <a:t>7/25/2021</a:t>
+              <a:t>7/26/2021</a:t>
             </a:fld>
             <a:endParaRPr lang="en-US"/>
           </a:p>
@@ -12710,7 +12710,7 @@
           <a:p>
             <a:fld id="{A884A402-9A27-48C5-B7F3-8545A451B1BF}" type="datetimeFigureOut">
               <a:rPr lang="en-US" smtClean="0"/>
-              <a:t>7/25/2021</a:t>
+              <a:t>7/26/2021</a:t>
             </a:fld>
             <a:endParaRPr lang="en-US"/>
           </a:p>
@@ -13690,7 +13690,7 @@
           <a:p>
             <a:fld id="{A884A402-9A27-48C5-B7F3-8545A451B1BF}" type="datetimeFigureOut">
               <a:rPr lang="en-US" smtClean="0"/>
-              <a:t>7/25/2021</a:t>
+              <a:t>7/26/2021</a:t>
             </a:fld>
             <a:endParaRPr lang="en-US"/>
           </a:p>
@@ -14824,7 +14824,7 @@
           <a:p>
             <a:fld id="{72FBF2AF-2DAC-4FB3-BCA8-0B78B7F8918A}" type="datetimeFigureOut">
               <a:rPr lang="en-US" smtClean="0"/>
-              <a:t>7/25/2021</a:t>
+              <a:t>7/26/2021</a:t>
             </a:fld>
             <a:endParaRPr lang="en-US"/>
           </a:p>
@@ -15857,7 +15857,7 @@
           <a:p>
             <a:fld id="{72FBF2AF-2DAC-4FB3-BCA8-0B78B7F8918A}" type="datetimeFigureOut">
               <a:rPr lang="en-US" smtClean="0"/>
-              <a:t>7/25/2021</a:t>
+              <a:t>7/26/2021</a:t>
             </a:fld>
             <a:endParaRPr lang="en-US"/>
           </a:p>
@@ -16517,7 +16517,7 @@
           <a:p>
             <a:fld id="{A884A402-9A27-48C5-B7F3-8545A451B1BF}" type="datetimeFigureOut">
               <a:rPr lang="en-US" smtClean="0"/>
-              <a:t>7/25/2021</a:t>
+              <a:t>7/26/2021</a:t>
             </a:fld>
             <a:endParaRPr lang="en-US"/>
           </a:p>
@@ -17378,7 +17378,7 @@
           <a:p>
             <a:fld id="{A884A402-9A27-48C5-B7F3-8545A451B1BF}" type="datetimeFigureOut">
               <a:rPr lang="en-US" smtClean="0"/>
-              <a:t>7/25/2021</a:t>
+              <a:t>7/26/2021</a:t>
             </a:fld>
             <a:endParaRPr lang="en-US"/>
           </a:p>
@@ -17568,7 +17568,7 @@
           <a:p>
             <a:fld id="{A884A402-9A27-48C5-B7F3-8545A451B1BF}" type="datetimeFigureOut">
               <a:rPr lang="en-US" smtClean="0"/>
-              <a:t>7/25/2021</a:t>
+              <a:t>7/26/2021</a:t>
             </a:fld>
             <a:endParaRPr lang="en-US"/>
           </a:p>
@@ -18540,7 +18540,7 @@
           <a:p>
             <a:fld id="{A884A402-9A27-48C5-B7F3-8545A451B1BF}" type="datetimeFigureOut">
               <a:rPr lang="en-US" smtClean="0"/>
-              <a:t>7/25/2021</a:t>
+              <a:t>7/26/2021</a:t>
             </a:fld>
             <a:endParaRPr lang="en-US"/>
           </a:p>
@@ -18829,7 +18829,7 @@
           <a:p>
             <a:fld id="{72FBF2AF-2DAC-4FB3-BCA8-0B78B7F8918A}" type="datetimeFigureOut">
               <a:rPr lang="en-US" smtClean="0"/>
-              <a:t>7/25/2021</a:t>
+              <a:t>7/26/2021</a:t>
             </a:fld>
             <a:endParaRPr lang="en-US"/>
           </a:p>
@@ -19241,7 +19241,7 @@
           <a:p>
             <a:fld id="{72FBF2AF-2DAC-4FB3-BCA8-0B78B7F8918A}" type="datetimeFigureOut">
               <a:rPr lang="en-US" smtClean="0"/>
-              <a:t>7/25/2021</a:t>
+              <a:t>7/26/2021</a:t>
             </a:fld>
             <a:endParaRPr lang="en-US"/>
           </a:p>
@@ -19382,7 +19382,7 @@
           <a:p>
             <a:fld id="{72FBF2AF-2DAC-4FB3-BCA8-0B78B7F8918A}" type="datetimeFigureOut">
               <a:rPr lang="en-US" smtClean="0"/>
-              <a:t>7/25/2021</a:t>
+              <a:t>7/26/2021</a:t>
             </a:fld>
             <a:endParaRPr lang="en-US"/>
           </a:p>
@@ -19495,7 +19495,7 @@
           <a:p>
             <a:fld id="{72FBF2AF-2DAC-4FB3-BCA8-0B78B7F8918A}" type="datetimeFigureOut">
               <a:rPr lang="en-US" smtClean="0"/>
-              <a:t>7/25/2021</a:t>
+              <a:t>7/26/2021</a:t>
             </a:fld>
             <a:endParaRPr lang="en-US"/>
           </a:p>
@@ -19806,7 +19806,7 @@
           <a:p>
             <a:fld id="{72FBF2AF-2DAC-4FB3-BCA8-0B78B7F8918A}" type="datetimeFigureOut">
               <a:rPr lang="en-US" smtClean="0"/>
-              <a:t>7/25/2021</a:t>
+              <a:t>7/26/2021</a:t>
             </a:fld>
             <a:endParaRPr lang="en-US"/>
           </a:p>
@@ -20094,7 +20094,7 @@
           <a:p>
             <a:fld id="{72FBF2AF-2DAC-4FB3-BCA8-0B78B7F8918A}" type="datetimeFigureOut">
               <a:rPr lang="en-US" smtClean="0"/>
-              <a:t>7/25/2021</a:t>
+              <a:t>7/26/2021</a:t>
             </a:fld>
             <a:endParaRPr lang="en-US"/>
           </a:p>
@@ -20344,7 +20344,7 @@
           <a:p>
             <a:fld id="{72FBF2AF-2DAC-4FB3-BCA8-0B78B7F8918A}" type="datetimeFigureOut">
               <a:rPr lang="en-US" smtClean="0"/>
-              <a:t>7/25/2021</a:t>
+              <a:t>7/26/2021</a:t>
             </a:fld>
             <a:endParaRPr lang="en-US"/>
           </a:p>
@@ -20912,7 +20912,7 @@
           <a:p>
             <a:fld id="{A884A402-9A27-48C5-B7F3-8545A451B1BF}" type="datetimeFigureOut">
               <a:rPr lang="en-US" smtClean="0"/>
-              <a:t>7/25/2021</a:t>
+              <a:t>7/26/2021</a:t>
             </a:fld>
             <a:endParaRPr lang="en-US"/>
           </a:p>
@@ -22212,7 +22212,7 @@
           <a:p>
             <a:fld id="{72FBF2AF-2DAC-4FB3-BCA8-0B78B7F8918A}" type="datetimeFigureOut">
               <a:rPr lang="en-US" smtClean="0"/>
-              <a:t>7/25/2021</a:t>
+              <a:t>7/26/2021</a:t>
             </a:fld>
             <a:endParaRPr lang="en-US"/>
           </a:p>
@@ -24085,10 +24085,160 @@
         </p:nvSpPr>
         <p:spPr/>
         <p:txBody>
-          <a:bodyPr/>
+          <a:bodyPr>
+            <a:normAutofit/>
+          </a:bodyPr>
           <a:lstStyle/>
           <a:p>
-            <a:endParaRPr lang="en-US" dirty="0"/>
+            <a:r>
+              <a:rPr lang="en-US" dirty="0">
+                <a:solidFill>
+                  <a:schemeClr val="bg1"/>
+                </a:solidFill>
+              </a:rPr>
+              <a:t>Planning to use software s like,</a:t>
+            </a:r>
+          </a:p>
+          <a:p>
+            <a:pPr marL="1371611" lvl="2" indent="-457200">
+              <a:buFont typeface="+mj-lt"/>
+              <a:buAutoNum type="arabicPeriod"/>
+            </a:pPr>
+            <a:r>
+              <a:rPr lang="en-US" dirty="0">
+                <a:solidFill>
+                  <a:schemeClr val="bg1"/>
+                </a:solidFill>
+              </a:rPr>
+              <a:t>Eclipse – for IDE to  code implementation</a:t>
+            </a:r>
+          </a:p>
+          <a:p>
+            <a:pPr marL="1371611" lvl="2" indent="-457200">
+              <a:buFont typeface="+mj-lt"/>
+              <a:buAutoNum type="arabicPeriod"/>
+            </a:pPr>
+            <a:r>
+              <a:rPr lang="en-US" dirty="0">
+                <a:solidFill>
+                  <a:schemeClr val="bg1"/>
+                </a:solidFill>
+              </a:rPr>
+              <a:t>Java – as a programming language</a:t>
+            </a:r>
+          </a:p>
+          <a:p>
+            <a:pPr marL="1371611" lvl="2" indent="-457200">
+              <a:buFont typeface="+mj-lt"/>
+              <a:buAutoNum type="arabicPeriod"/>
+            </a:pPr>
+            <a:r>
+              <a:rPr lang="en-US" dirty="0">
+                <a:solidFill>
+                  <a:schemeClr val="bg1"/>
+                </a:solidFill>
+              </a:rPr>
+              <a:t>Scene Builder – to develop the UI / UX</a:t>
+            </a:r>
+          </a:p>
+          <a:p>
+            <a:pPr marL="1371611" lvl="2" indent="-457200">
+              <a:buFont typeface="+mj-lt"/>
+              <a:buAutoNum type="arabicPeriod"/>
+            </a:pPr>
+            <a:r>
+              <a:rPr lang="en-US" dirty="0">
+                <a:solidFill>
+                  <a:schemeClr val="bg1"/>
+                </a:solidFill>
+              </a:rPr>
+              <a:t>MongoDB , MYSQL – to create the database</a:t>
+            </a:r>
+          </a:p>
+          <a:p>
+            <a:pPr marL="1371611" lvl="2" indent="-457200">
+              <a:buFont typeface="+mj-lt"/>
+              <a:buAutoNum type="arabicPeriod"/>
+            </a:pPr>
+            <a:endParaRPr lang="en-US" dirty="0">
+              <a:solidFill>
+                <a:schemeClr val="bg1"/>
+              </a:solidFill>
+            </a:endParaRPr>
+          </a:p>
+          <a:p>
+            <a:r>
+              <a:rPr lang="en-US" dirty="0">
+                <a:solidFill>
+                  <a:schemeClr val="bg1"/>
+                </a:solidFill>
+              </a:rPr>
+              <a:t>Develop a desktop application using </a:t>
+            </a:r>
+            <a:r>
+              <a:rPr lang="en-US" dirty="0" err="1">
+                <a:solidFill>
+                  <a:schemeClr val="bg1"/>
+                </a:solidFill>
+              </a:rPr>
+              <a:t>JavaFx</a:t>
+            </a:r>
+            <a:r>
+              <a:rPr lang="en-US" dirty="0">
+                <a:solidFill>
+                  <a:schemeClr val="bg1"/>
+                </a:solidFill>
+              </a:rPr>
+              <a:t> frame work.</a:t>
+            </a:r>
+          </a:p>
+          <a:p>
+            <a:endParaRPr lang="en-US" dirty="0">
+              <a:solidFill>
+                <a:schemeClr val="bg1"/>
+              </a:solidFill>
+            </a:endParaRPr>
+          </a:p>
+          <a:p>
+            <a:r>
+              <a:rPr lang="en-US" dirty="0">
+                <a:solidFill>
+                  <a:schemeClr val="bg1"/>
+                </a:solidFill>
+              </a:rPr>
+              <a:t>Other necessary libraries will be used to create quality UI and UX</a:t>
+            </a:r>
+          </a:p>
+          <a:p>
+            <a:endParaRPr lang="en-US" dirty="0">
+              <a:solidFill>
+                <a:schemeClr val="bg1"/>
+              </a:solidFill>
+            </a:endParaRPr>
+          </a:p>
+          <a:p>
+            <a:endParaRPr lang="en-US" dirty="0">
+              <a:solidFill>
+                <a:schemeClr val="bg1"/>
+              </a:solidFill>
+            </a:endParaRPr>
+          </a:p>
+          <a:p>
+            <a:endParaRPr lang="en-US" dirty="0">
+              <a:solidFill>
+                <a:schemeClr val="bg1"/>
+              </a:solidFill>
+            </a:endParaRPr>
+          </a:p>
+          <a:p>
+            <a:pPr marL="914411" lvl="2" indent="0">
+              <a:buNone/>
+            </a:pPr>
+            <a:endParaRPr lang="en-US" dirty="0">
+              <a:solidFill>
+                <a:schemeClr val="bg1"/>
+              </a:solidFill>
+            </a:endParaRPr>
           </a:p>
         </p:txBody>
       </p:sp>
@@ -25690,6 +25840,200 @@
               </a:rPr>
               <a:t>System Functions</a:t>
             </a:r>
+          </a:p>
+        </p:txBody>
+      </p:sp>
+      <p:sp>
+        <p:nvSpPr>
+          <p:cNvPr id="4" name="TextBox 3">
+            <a:extLst>
+              <a:ext uri="{FF2B5EF4-FFF2-40B4-BE49-F238E27FC236}">
+                <a16:creationId xmlns:a16="http://schemas.microsoft.com/office/drawing/2014/main" id="{006EC712-06A7-4981-B47C-2CE574CEEE24}"/>
+              </a:ext>
+            </a:extLst>
+          </p:cNvPr>
+          <p:cNvSpPr txBox="1"/>
+          <p:nvPr/>
+        </p:nvSpPr>
+        <p:spPr>
+          <a:xfrm>
+            <a:off x="838202" y="2224454"/>
+            <a:ext cx="10090636" cy="3416320"/>
+          </a:xfrm>
+          <a:prstGeom prst="rect">
+            <a:avLst/>
+          </a:prstGeom>
+          <a:noFill/>
+        </p:spPr>
+        <p:txBody>
+          <a:bodyPr wrap="square" rtlCol="0">
+            <a:spAutoFit/>
+          </a:bodyPr>
+          <a:lstStyle/>
+          <a:p>
+            <a:pPr marL="342900" indent="-342900">
+              <a:buFont typeface="+mj-lt"/>
+              <a:buAutoNum type="arabicPeriod"/>
+            </a:pPr>
+            <a:r>
+              <a:rPr lang="en-US" sz="1800" b="1" dirty="0">
+                <a:solidFill>
+                  <a:schemeClr val="bg1"/>
+                </a:solidFill>
+                <a:latin typeface="Agency FB" panose="020B0503020202020204" pitchFamily="34" charset="0"/>
+              </a:rPr>
+              <a:t>Vehicle Repairing, Workload and Maintenance Management of Vehicles</a:t>
+            </a:r>
+          </a:p>
+          <a:p>
+            <a:pPr marL="342900" indent="-342900">
+              <a:buFont typeface="+mj-lt"/>
+              <a:buAutoNum type="arabicPeriod"/>
+            </a:pPr>
+            <a:r>
+              <a:rPr lang="en-US" sz="1800" b="1" dirty="0">
+                <a:solidFill>
+                  <a:schemeClr val="bg1"/>
+                </a:solidFill>
+                <a:latin typeface="Agency FB" panose="020B0503020202020204" pitchFamily="34" charset="0"/>
+              </a:rPr>
+              <a:t>Metal Crusher Machines Repairing, Workload and Maintenance Management</a:t>
+            </a:r>
+          </a:p>
+          <a:p>
+            <a:pPr marL="342900" indent="-342900">
+              <a:buFont typeface="+mj-lt"/>
+              <a:buAutoNum type="arabicPeriod"/>
+            </a:pPr>
+            <a:r>
+              <a:rPr lang="en-US" sz="1800" b="1" dirty="0">
+                <a:solidFill>
+                  <a:schemeClr val="bg1"/>
+                </a:solidFill>
+                <a:latin typeface="Agency FB" panose="020B0503020202020204" pitchFamily="34" charset="0"/>
+              </a:rPr>
+              <a:t>Loader Machines Repairing, Workload and Maintenance Management</a:t>
+            </a:r>
+          </a:p>
+          <a:p>
+            <a:pPr marL="342900" indent="-342900">
+              <a:buFont typeface="+mj-lt"/>
+              <a:buAutoNum type="arabicPeriod"/>
+            </a:pPr>
+            <a:r>
+              <a:rPr lang="en-US" sz="1800" b="1" dirty="0">
+                <a:solidFill>
+                  <a:schemeClr val="bg1"/>
+                </a:solidFill>
+                <a:latin typeface="Agency FB" panose="020B0503020202020204" pitchFamily="34" charset="0"/>
+              </a:rPr>
+              <a:t>Generator Machines Repairing, Workload and Maintenance Management and Sales Management</a:t>
+            </a:r>
+          </a:p>
+          <a:p>
+            <a:pPr marL="342900" indent="-342900">
+              <a:buFont typeface="+mj-lt"/>
+              <a:buAutoNum type="arabicPeriod"/>
+            </a:pPr>
+            <a:r>
+              <a:rPr lang="en-US" sz="1800" b="1" dirty="0">
+                <a:solidFill>
+                  <a:schemeClr val="bg1"/>
+                </a:solidFill>
+                <a:latin typeface="Agency FB" panose="020B0503020202020204" pitchFamily="34" charset="0"/>
+              </a:rPr>
+              <a:t>Administrative Tasks and Employee Attendance Management</a:t>
+            </a:r>
+          </a:p>
+          <a:p>
+            <a:pPr marL="342900" indent="-342900">
+              <a:buFont typeface="+mj-lt"/>
+              <a:buAutoNum type="arabicPeriod"/>
+            </a:pPr>
+            <a:r>
+              <a:rPr lang="en-US" sz="1800" b="1" dirty="0">
+                <a:solidFill>
+                  <a:schemeClr val="bg1"/>
+                </a:solidFill>
+                <a:latin typeface="Agency FB" panose="020B0503020202020204" pitchFamily="34" charset="0"/>
+              </a:rPr>
+              <a:t>Hammer, Compressor Machines Repairing, Workload and Maintenance Management</a:t>
+            </a:r>
+            <a:endParaRPr lang="en-US" b="1" dirty="0">
+              <a:solidFill>
+                <a:schemeClr val="bg1"/>
+              </a:solidFill>
+              <a:latin typeface="Agency FB" panose="020B0503020202020204" pitchFamily="34" charset="0"/>
+            </a:endParaRPr>
+          </a:p>
+          <a:p>
+            <a:pPr marL="342900" indent="-342900">
+              <a:buFont typeface="+mj-lt"/>
+              <a:buAutoNum type="arabicPeriod"/>
+            </a:pPr>
+            <a:r>
+              <a:rPr lang="en-US" sz="1800" b="1" dirty="0">
+                <a:solidFill>
+                  <a:schemeClr val="bg1"/>
+                </a:solidFill>
+                <a:latin typeface="Agency FB" panose="020B0503020202020204" pitchFamily="34" charset="0"/>
+              </a:rPr>
+              <a:t>Excavator Machines Repairing, Workload and Maintenance Management</a:t>
+            </a:r>
+          </a:p>
+          <a:p>
+            <a:pPr marL="342900" indent="-342900">
+              <a:buFont typeface="+mj-lt"/>
+              <a:buAutoNum type="arabicPeriod"/>
+            </a:pPr>
+            <a:r>
+              <a:rPr lang="en-US" sz="1800" b="1" dirty="0">
+                <a:solidFill>
+                  <a:schemeClr val="bg1"/>
+                </a:solidFill>
+                <a:latin typeface="Agency FB" panose="020B0503020202020204" pitchFamily="34" charset="0"/>
+              </a:rPr>
+              <a:t>Other Remaining Items in Stock Management</a:t>
+            </a:r>
+          </a:p>
+          <a:p>
+            <a:pPr marL="342900" indent="-342900">
+              <a:buFont typeface="+mj-lt"/>
+              <a:buAutoNum type="arabicPeriod"/>
+            </a:pPr>
+            <a:endParaRPr lang="en-US" b="1" dirty="0">
+              <a:solidFill>
+                <a:schemeClr val="bg1"/>
+              </a:solidFill>
+              <a:latin typeface="Agency FB" panose="020B0503020202020204" pitchFamily="34" charset="0"/>
+            </a:endParaRPr>
+          </a:p>
+          <a:p>
+            <a:pPr marL="342900" indent="-342900">
+              <a:buFont typeface="+mj-lt"/>
+              <a:buAutoNum type="arabicPeriod"/>
+            </a:pPr>
+            <a:endParaRPr lang="en-US" sz="1800" b="1" dirty="0">
+              <a:solidFill>
+                <a:schemeClr val="bg1"/>
+              </a:solidFill>
+              <a:latin typeface="Agency FB" panose="020B0503020202020204" pitchFamily="34" charset="0"/>
+            </a:endParaRPr>
+          </a:p>
+          <a:p>
+            <a:pPr marL="342900" indent="-342900">
+              <a:buFont typeface="+mj-lt"/>
+              <a:buAutoNum type="arabicPeriod"/>
+            </a:pPr>
+            <a:endParaRPr lang="en-US" sz="1800" b="1" dirty="0">
+              <a:solidFill>
+                <a:schemeClr val="bg1"/>
+              </a:solidFill>
+              <a:latin typeface="Agency FB" panose="020B0503020202020204" pitchFamily="34" charset="0"/>
+            </a:endParaRPr>
+          </a:p>
+          <a:p>
+            <a:endParaRPr lang="en-US" dirty="0"/>
           </a:p>
         </p:txBody>
       </p:sp>

</xml_diff>